<commit_message>
Roadmap final final final
</commit_message>
<xml_diff>
--- a/Fly Big/Roadmap.pptx
+++ b/Fly Big/Roadmap.pptx
@@ -2573,16 +2573,34 @@
     </dgm:pt>
     <dgm:pt modelId="{C6D5EA8A-11BE-CE48-9178-F17991ED0C1C}">
       <dgm:prSet phldrT="[Text]" custT="1"/>
-      <dgm:spPr/>
+      <dgm:spPr>
+        <a:solidFill>
+          <a:srgbClr val="EBEC02">
+            <a:alpha val="21000"/>
+          </a:srgbClr>
+        </a:solidFill>
+      </dgm:spPr>
       <dgm:t>
         <a:bodyPr/>
         <a:lstStyle/>
         <a:p>
           <a:r>
-            <a:rPr lang="en-US" sz="2200" dirty="0" smtClean="0"/>
+            <a:rPr lang="en-US" sz="2200" dirty="0" smtClean="0">
+              <a:solidFill>
+                <a:schemeClr val="accent6">
+                  <a:lumMod val="75000"/>
+                </a:schemeClr>
+              </a:solidFill>
+            </a:rPr>
             <a:t>Data Science Lab</a:t>
           </a:r>
-          <a:endParaRPr lang="en-US" sz="2200" dirty="0"/>
+          <a:endParaRPr lang="en-US" sz="2200" dirty="0">
+            <a:solidFill>
+              <a:schemeClr val="accent6">
+                <a:lumMod val="75000"/>
+              </a:schemeClr>
+            </a:solidFill>
+          </a:endParaRPr>
         </a:p>
       </dgm:t>
     </dgm:pt>
@@ -2995,7 +3013,7 @@
   <dgm:whole/>
   <dgm:extLst>
     <a:ext uri="http://schemas.microsoft.com/office/drawing/2008/diagram">
-      <dsp:dataModelExt xmlns:dsp="http://schemas.microsoft.com/office/drawing/2008/diagram" relId="rId6" minVer="http://schemas.openxmlformats.org/drawingml/2006/diagram"/>
+      <dsp:dataModelExt xmlns:dsp="http://schemas.microsoft.com/office/drawing/2008/diagram" relId="rId7" minVer="http://schemas.openxmlformats.org/drawingml/2006/diagram"/>
     </a:ext>
   </dgm:extLst>
 </dgm:dataModel>
@@ -3763,41 +3781,11 @@
         <a:prstGeom prst="chevron">
           <a:avLst/>
         </a:prstGeom>
-        <a:gradFill rotWithShape="0">
-          <a:gsLst>
-            <a:gs pos="0">
-              <a:schemeClr val="accent1">
-                <a:hueOff val="0"/>
-                <a:satOff val="0"/>
-                <a:lumOff val="0"/>
-                <a:alphaOff val="0"/>
-                <a:shade val="51000"/>
-                <a:satMod val="130000"/>
-              </a:schemeClr>
-            </a:gs>
-            <a:gs pos="80000">
-              <a:schemeClr val="accent1">
-                <a:hueOff val="0"/>
-                <a:satOff val="0"/>
-                <a:lumOff val="0"/>
-                <a:alphaOff val="0"/>
-                <a:shade val="93000"/>
-                <a:satMod val="130000"/>
-              </a:schemeClr>
-            </a:gs>
-            <a:gs pos="100000">
-              <a:schemeClr val="accent1">
-                <a:hueOff val="0"/>
-                <a:satOff val="0"/>
-                <a:lumOff val="0"/>
-                <a:alphaOff val="0"/>
-                <a:shade val="94000"/>
-                <a:satMod val="135000"/>
-              </a:schemeClr>
-            </a:gs>
-          </a:gsLst>
-          <a:lin ang="16200000" scaled="0"/>
-        </a:gradFill>
+        <a:solidFill>
+          <a:srgbClr val="EBEC02">
+            <a:alpha val="21000"/>
+          </a:srgbClr>
+        </a:solidFill>
         <a:ln>
           <a:noFill/>
         </a:ln>
@@ -3841,10 +3829,22 @@
             </a:spcAft>
           </a:pPr>
           <a:r>
-            <a:rPr lang="en-US" sz="2200" kern="1200" dirty="0" smtClean="0"/>
+            <a:rPr lang="en-US" sz="2200" kern="1200" dirty="0" smtClean="0">
+              <a:solidFill>
+                <a:schemeClr val="accent6">
+                  <a:lumMod val="75000"/>
+                </a:schemeClr>
+              </a:solidFill>
+            </a:rPr>
             <a:t>Data Science Lab</a:t>
           </a:r>
-          <a:endParaRPr lang="en-US" sz="2200" kern="1200" dirty="0"/>
+          <a:endParaRPr lang="en-US" sz="2200" kern="1200" dirty="0">
+            <a:solidFill>
+              <a:schemeClr val="accent6">
+                <a:lumMod val="75000"/>
+              </a:schemeClr>
+            </a:solidFill>
+          </a:endParaRPr>
         </a:p>
       </dsp:txBody>
       <dsp:txXfrm>
@@ -8321,46 +8321,6 @@
               <a:tabLst/>
               <a:defRPr/>
             </a:pPr>
-            <a:endParaRPr lang="en-US" sz="4000" dirty="0" smtClean="0"/>
-          </a:p>
-          <a:p>
-            <a:pPr marL="0" marR="0" indent="0" algn="l" defTabSz="914400" rtl="0" eaLnBrk="1" fontAlgn="auto" latinLnBrk="0" hangingPunct="1">
-              <a:lnSpc>
-                <a:spcPct val="95000"/>
-              </a:lnSpc>
-              <a:spcBef>
-                <a:spcPts val="400"/>
-              </a:spcBef>
-              <a:spcAft>
-                <a:spcPts val="0"/>
-              </a:spcAft>
-              <a:buClrTx/>
-              <a:buSzTx/>
-              <a:buFont typeface="Arial" panose="020B0604020202020204" pitchFamily="34" charset="0"/>
-              <a:buNone/>
-              <a:tabLst/>
-              <a:defRPr/>
-            </a:pPr>
-            <a:endParaRPr lang="en-US" sz="4000" dirty="0" smtClean="0"/>
-          </a:p>
-          <a:p>
-            <a:pPr marL="0" marR="0" indent="0" algn="l" defTabSz="914400" rtl="0" eaLnBrk="1" fontAlgn="auto" latinLnBrk="0" hangingPunct="1">
-              <a:lnSpc>
-                <a:spcPct val="95000"/>
-              </a:lnSpc>
-              <a:spcBef>
-                <a:spcPts val="400"/>
-              </a:spcBef>
-              <a:spcAft>
-                <a:spcPts val="0"/>
-              </a:spcAft>
-              <a:buClrTx/>
-              <a:buSzTx/>
-              <a:buFont typeface="Arial" panose="020B0604020202020204" pitchFamily="34" charset="0"/>
-              <a:buNone/>
-              <a:tabLst/>
-              <a:defRPr/>
-            </a:pPr>
             <a:r>
               <a:rPr lang="en-US" sz="4000" dirty="0" smtClean="0"/>
               <a:t>GM everyone </a:t>
@@ -8558,6 +8518,90 @@
 </p:notes>
 </file>
 
+<file path=ppt/notesSlides/notesSlide11.xml><?xml version="1.0" encoding="utf-8"?>
+<p:notes xmlns:a="http://schemas.openxmlformats.org/drawingml/2006/main" xmlns:r="http://schemas.openxmlformats.org/officeDocument/2006/relationships" xmlns:p="http://schemas.openxmlformats.org/presentationml/2006/main">
+  <p:cSld>
+    <p:spTree>
+      <p:nvGrpSpPr>
+        <p:cNvPr id="1" name=""/>
+        <p:cNvGrpSpPr/>
+        <p:nvPr/>
+      </p:nvGrpSpPr>
+      <p:grpSpPr>
+        <a:xfrm>
+          <a:off x="0" y="0"/>
+          <a:ext cx="0" cy="0"/>
+          <a:chOff x="0" y="0"/>
+          <a:chExt cx="0" cy="0"/>
+        </a:xfrm>
+      </p:grpSpPr>
+      <p:sp>
+        <p:nvSpPr>
+          <p:cNvPr id="2" name="Slide Image Placeholder 1"/>
+          <p:cNvSpPr>
+            <a:spLocks noGrp="1" noRot="1" noChangeAspect="1"/>
+          </p:cNvSpPr>
+          <p:nvPr>
+            <p:ph type="sldImg"/>
+          </p:nvPr>
+        </p:nvSpPr>
+        <p:spPr/>
+      </p:sp>
+      <p:sp>
+        <p:nvSpPr>
+          <p:cNvPr id="3" name="Notes Placeholder 2"/>
+          <p:cNvSpPr>
+            <a:spLocks noGrp="1"/>
+          </p:cNvSpPr>
+          <p:nvPr>
+            <p:ph type="body" idx="1"/>
+          </p:nvPr>
+        </p:nvSpPr>
+        <p:spPr/>
+        <p:txBody>
+          <a:bodyPr/>
+          <a:lstStyle/>
+          <a:p>
+            <a:endParaRPr lang="en-US" dirty="0"/>
+          </a:p>
+        </p:txBody>
+      </p:sp>
+      <p:sp>
+        <p:nvSpPr>
+          <p:cNvPr id="4" name="Slide Number Placeholder 3"/>
+          <p:cNvSpPr>
+            <a:spLocks noGrp="1"/>
+          </p:cNvSpPr>
+          <p:nvPr>
+            <p:ph type="sldNum" sz="quarter" idx="10"/>
+          </p:nvPr>
+        </p:nvSpPr>
+        <p:spPr/>
+        <p:txBody>
+          <a:bodyPr/>
+          <a:lstStyle/>
+          <a:p>
+            <a:fld id="{770372E8-387C-2648-A2EB-DF52FF43CDE3}" type="slidenum">
+              <a:rPr lang="en-US" smtClean="0"/>
+              <a:t>14</a:t>
+            </a:fld>
+            <a:endParaRPr lang="en-US"/>
+          </a:p>
+        </p:txBody>
+      </p:sp>
+    </p:spTree>
+    <p:extLst>
+      <p:ext uri="{BB962C8B-B14F-4D97-AF65-F5344CB8AC3E}">
+        <p14:creationId xmlns:p14="http://schemas.microsoft.com/office/powerpoint/2010/main" val="265237784"/>
+      </p:ext>
+    </p:extLst>
+  </p:cSld>
+  <p:clrMapOvr>
+    <a:masterClrMapping/>
+  </p:clrMapOvr>
+</p:notes>
+</file>
+
 <file path=ppt/notesSlides/notesSlide2.xml><?xml version="1.0" encoding="utf-8"?>
 <p:notes xmlns:a="http://schemas.openxmlformats.org/drawingml/2006/main" xmlns:r="http://schemas.openxmlformats.org/officeDocument/2006/relationships" xmlns:p="http://schemas.openxmlformats.org/presentationml/2006/main">
   <p:cSld>
@@ -8628,7 +8672,7 @@
             </a:r>
             <a:r>
               <a:rPr lang="en-US" sz="2400" baseline="0" dirty="0" smtClean="0"/>
-              <a:t> business and their requirements,</a:t>
+              <a:t> business and goals,</a:t>
             </a:r>
             <a:endParaRPr lang="en-US" sz="2400" baseline="0" dirty="0" smtClean="0"/>
           </a:p>
@@ -8654,7 +8698,7 @@
             </a:r>
             <a:r>
               <a:rPr lang="en-US" sz="2400" baseline="0" dirty="0" smtClean="0"/>
-              <a:t> </a:t>
+              <a:t> that could help overcome the challenges,</a:t>
             </a:r>
           </a:p>
           <a:p>
@@ -8674,7 +8718,7 @@
             </a:r>
             <a:r>
               <a:rPr lang="en-US" sz="2400" baseline="0" dirty="0" smtClean="0"/>
-              <a:t> about predicting flight delays as a service which could add a new revenue stream to </a:t>
+              <a:t> about predicting flight delays which can be sold as a service adding a new revenue stream to </a:t>
             </a:r>
             <a:r>
               <a:rPr lang="en-US" sz="2400" baseline="0" dirty="0" err="1" smtClean="0"/>
@@ -8829,6 +8873,71 @@
           <a:bodyPr/>
           <a:lstStyle/>
           <a:p>
+            <a:pPr marL="0" indent="0">
+              <a:buNone/>
+            </a:pPr>
+            <a:endParaRPr lang="en-GB" sz="2400" dirty="0" smtClean="0">
+              <a:latin typeface="Century Gothic" charset="0"/>
+            </a:endParaRPr>
+          </a:p>
+          <a:p>
+            <a:r>
+              <a:rPr lang="en-GB" sz="2400" dirty="0" err="1" smtClean="0">
+                <a:latin typeface="Century Gothic" charset="0"/>
+              </a:rPr>
+              <a:t>Skynet</a:t>
+            </a:r>
+            <a:r>
+              <a:rPr lang="en-GB" sz="2400" dirty="0" smtClean="0">
+                <a:latin typeface="Century Gothic" charset="0"/>
+              </a:rPr>
+              <a:t> wants to create an Analytical roadmap </a:t>
+            </a:r>
+            <a:r>
+              <a:rPr lang="en-GB" sz="2400" dirty="0" err="1" smtClean="0">
+                <a:latin typeface="Century Gothic" charset="0"/>
+              </a:rPr>
+              <a:t>inorde</a:t>
+            </a:r>
+            <a:r>
+              <a:rPr lang="en-GB" sz="2400" baseline="0" dirty="0" err="1" smtClean="0">
+                <a:latin typeface="Century Gothic" charset="0"/>
+              </a:rPr>
+              <a:t>r</a:t>
+            </a:r>
+            <a:r>
+              <a:rPr lang="en-GB" sz="2400" baseline="0" dirty="0" smtClean="0">
+                <a:latin typeface="Century Gothic" charset="0"/>
+              </a:rPr>
+              <a:t> to start the data discovery &amp; deploy the analytical </a:t>
+            </a:r>
+            <a:r>
+              <a:rPr lang="en-GB" sz="2400" baseline="0" dirty="0" err="1" smtClean="0">
+                <a:latin typeface="Century Gothic" charset="0"/>
+              </a:rPr>
+              <a:t>usecases</a:t>
+            </a:r>
+            <a:r>
+              <a:rPr lang="en-GB" sz="2400" baseline="0" dirty="0" smtClean="0">
+                <a:latin typeface="Century Gothic" charset="0"/>
+              </a:rPr>
+              <a:t>,</a:t>
+            </a:r>
+          </a:p>
+          <a:p>
+            <a:endParaRPr lang="en-GB" sz="2400" dirty="0" smtClean="0">
+              <a:latin typeface="Century Gothic" charset="0"/>
+            </a:endParaRPr>
+          </a:p>
+          <a:p>
+            <a:r>
+              <a:rPr lang="en-GB" sz="2400" dirty="0" smtClean="0">
+                <a:latin typeface="Century Gothic" charset="0"/>
+              </a:rPr>
+              <a:t>This helps them become data driven &amp; boost revenue by reducing operational costs &amp; identify new revenue streams.</a:t>
+            </a:r>
+          </a:p>
+          <a:p>
             <a:pPr marL="0" marR="0" indent="0" algn="l" defTabSz="914377" rtl="0" eaLnBrk="1" fontAlgn="auto" latinLnBrk="0" hangingPunct="1">
               <a:lnSpc>
                 <a:spcPct val="100000"/>
@@ -8846,11 +8955,149 @@
               <a:tabLst/>
               <a:defRPr/>
             </a:pPr>
+            <a:endParaRPr lang="en-GB" sz="2400" dirty="0" smtClean="0">
+              <a:latin typeface="Century Gothic" charset="0"/>
+            </a:endParaRPr>
+          </a:p>
+          <a:p>
+            <a:pPr marL="0" marR="0" indent="0" algn="l" defTabSz="914377" rtl="0" eaLnBrk="1" fontAlgn="auto" latinLnBrk="0" hangingPunct="1">
+              <a:lnSpc>
+                <a:spcPct val="100000"/>
+              </a:lnSpc>
+              <a:spcBef>
+                <a:spcPts val="0"/>
+              </a:spcBef>
+              <a:spcAft>
+                <a:spcPts val="0"/>
+              </a:spcAft>
+              <a:buClrTx/>
+              <a:buSzTx/>
+              <a:buFontTx/>
+              <a:buNone/>
+              <a:tabLst/>
+              <a:defRPr/>
+            </a:pPr>
+            <a:endParaRPr lang="en-GB" sz="1200" dirty="0" smtClean="0">
+              <a:latin typeface="Century Gothic" charset="0"/>
+            </a:endParaRPr>
+          </a:p>
+          <a:p>
+            <a:pPr marL="0" marR="0" indent="0" algn="l" defTabSz="914377" rtl="0" eaLnBrk="1" fontAlgn="auto" latinLnBrk="0" hangingPunct="1">
+              <a:lnSpc>
+                <a:spcPct val="100000"/>
+              </a:lnSpc>
+              <a:spcBef>
+                <a:spcPts val="0"/>
+              </a:spcBef>
+              <a:spcAft>
+                <a:spcPts val="0"/>
+              </a:spcAft>
+              <a:buClrTx/>
+              <a:buSzTx/>
+              <a:buFontTx/>
+              <a:buNone/>
+              <a:tabLst/>
+              <a:defRPr/>
+            </a:pPr>
+            <a:endParaRPr lang="en-GB" sz="1200" dirty="0" smtClean="0">
+              <a:latin typeface="Century Gothic" charset="0"/>
+            </a:endParaRPr>
+          </a:p>
+          <a:p>
+            <a:pPr marL="0" marR="0" indent="0" algn="l" defTabSz="914377" rtl="0" eaLnBrk="1" fontAlgn="auto" latinLnBrk="0" hangingPunct="1">
+              <a:lnSpc>
+                <a:spcPct val="100000"/>
+              </a:lnSpc>
+              <a:spcBef>
+                <a:spcPts val="0"/>
+              </a:spcBef>
+              <a:spcAft>
+                <a:spcPts val="0"/>
+              </a:spcAft>
+              <a:buClrTx/>
+              <a:buSzTx/>
+              <a:buFontTx/>
+              <a:buNone/>
+              <a:tabLst/>
+              <a:defRPr/>
+            </a:pPr>
+            <a:endParaRPr lang="en-GB" sz="1200" dirty="0" smtClean="0">
+              <a:latin typeface="Century Gothic" charset="0"/>
+            </a:endParaRPr>
+          </a:p>
+          <a:p>
+            <a:pPr marL="0" marR="0" indent="0" algn="l" defTabSz="914377" rtl="0" eaLnBrk="1" fontAlgn="auto" latinLnBrk="0" hangingPunct="1">
+              <a:lnSpc>
+                <a:spcPct val="100000"/>
+              </a:lnSpc>
+              <a:spcBef>
+                <a:spcPts val="0"/>
+              </a:spcBef>
+              <a:spcAft>
+                <a:spcPts val="0"/>
+              </a:spcAft>
+              <a:buClrTx/>
+              <a:buSzTx/>
+              <a:buFontTx/>
+              <a:buNone/>
+              <a:tabLst/>
+              <a:defRPr/>
+            </a:pPr>
+            <a:endParaRPr lang="en-GB" sz="1200" dirty="0" smtClean="0">
+              <a:latin typeface="Century Gothic" charset="0"/>
+            </a:endParaRPr>
+          </a:p>
+          <a:p>
+            <a:pPr marL="0" marR="0" indent="0" algn="l" defTabSz="914377" rtl="0" eaLnBrk="1" fontAlgn="auto" latinLnBrk="0" hangingPunct="1">
+              <a:lnSpc>
+                <a:spcPct val="100000"/>
+              </a:lnSpc>
+              <a:spcBef>
+                <a:spcPts val="0"/>
+              </a:spcBef>
+              <a:spcAft>
+                <a:spcPts val="0"/>
+              </a:spcAft>
+              <a:buClrTx/>
+              <a:buSzTx/>
+              <a:buFontTx/>
+              <a:buNone/>
+              <a:tabLst/>
+              <a:defRPr/>
+            </a:pPr>
+            <a:endParaRPr lang="en-GB" sz="1200" dirty="0" smtClean="0">
+              <a:latin typeface="Century Gothic" charset="0"/>
+            </a:endParaRPr>
+          </a:p>
+          <a:p>
+            <a:pPr marL="0" marR="0" indent="0" algn="l" defTabSz="914377" rtl="0" eaLnBrk="1" fontAlgn="auto" latinLnBrk="0" hangingPunct="1">
+              <a:lnSpc>
+                <a:spcPct val="100000"/>
+              </a:lnSpc>
+              <a:spcBef>
+                <a:spcPts val="0"/>
+              </a:spcBef>
+              <a:spcAft>
+                <a:spcPts val="0"/>
+              </a:spcAft>
+              <a:buClrTx/>
+              <a:buSzTx/>
+              <a:buFontTx/>
+              <a:buNone/>
+              <a:tabLst/>
+              <a:defRPr/>
+            </a:pPr>
             <a:r>
               <a:rPr lang="en-GB" sz="1200" dirty="0" smtClean="0">
                 <a:latin typeface="Century Gothic" charset="0"/>
               </a:rPr>
-              <a:t>The FAA published Federal flight regulation in  2010 requiring all airspace to have an  Automatic Dependent Surveillance – Broadcast (ADS-B). </a:t>
+              <a:t>The </a:t>
+            </a:r>
+            <a:r>
+              <a:rPr lang="en-GB" sz="1200" dirty="0" smtClean="0">
+                <a:latin typeface="Century Gothic" charset="0"/>
+              </a:rPr>
+              <a:t>FAA published Federal flight regulation in  2010 requiring all airspace to have an  Automatic Dependent Surveillance – Broadcast (ADS-B). </a:t>
             </a:r>
             <a:endParaRPr lang="en-GB" sz="1200" dirty="0" smtClean="0">
               <a:latin typeface="Century Gothic" charset="0"/>
@@ -9115,19 +9362,15 @@
             </a:pPr>
             <a:r>
               <a:rPr lang="en-US" sz="2400" dirty="0" smtClean="0"/>
-              <a:t>Identified &amp; developed</a:t>
-            </a:r>
-            <a:r>
-              <a:rPr lang="en-US" sz="2400" baseline="0" dirty="0" smtClean="0"/>
-              <a:t> </a:t>
+              <a:t>Tried to understand the </a:t>
+            </a:r>
+            <a:r>
+              <a:rPr lang="en-US" sz="2400" dirty="0" err="1" smtClean="0"/>
+              <a:t>busines</a:t>
             </a:r>
             <a:r>
               <a:rPr lang="en-US" sz="2400" dirty="0" smtClean="0"/>
-              <a:t>the use case</a:t>
-            </a:r>
-            <a:r>
-              <a:rPr lang="en-US" sz="2400" baseline="0" dirty="0" smtClean="0"/>
-              <a:t> details </a:t>
+              <a:t> problem </a:t>
             </a:r>
           </a:p>
           <a:p>
@@ -9141,36 +9384,16 @@
             <a:endParaRPr lang="en-US" sz="2400" dirty="0" smtClean="0"/>
           </a:p>
           <a:p>
-            <a:pPr marL="457189" marR="0" indent="-457189" algn="l" defTabSz="914377" rtl="0" eaLnBrk="1" fontAlgn="auto" latinLnBrk="0" hangingPunct="1">
-              <a:lnSpc>
-                <a:spcPct val="100000"/>
-              </a:lnSpc>
-              <a:spcBef>
-                <a:spcPts val="0"/>
-              </a:spcBef>
-              <a:spcAft>
-                <a:spcPts val="0"/>
-              </a:spcAft>
+            <a:pPr marL="457189" indent="-457189">
               <a:buClr>
                 <a:schemeClr val="accent1"/>
               </a:buClr>
-              <a:buSzTx/>
               <a:buFont typeface="+mj-lt"/>
               <a:buAutoNum type="arabicPeriod"/>
-              <a:tabLst/>
-              <a:defRPr/>
             </a:pPr>
             <a:r>
               <a:rPr lang="en-US" sz="2400" dirty="0" smtClean="0"/>
-              <a:t>Estimated</a:t>
-            </a:r>
-            <a:r>
-              <a:rPr lang="en-US" sz="2400" baseline="0" dirty="0" smtClean="0"/>
-              <a:t> ROI &amp; </a:t>
-            </a:r>
-            <a:r>
-              <a:rPr lang="en-US" sz="2400" dirty="0" smtClean="0"/>
-              <a:t>Developed</a:t>
+              <a:t>Identified &amp; developed</a:t>
             </a:r>
             <a:r>
               <a:rPr lang="en-US" sz="2400" baseline="0" dirty="0" smtClean="0"/>
@@ -9178,7 +9401,11 @@
             </a:r>
             <a:r>
               <a:rPr lang="en-US" sz="2400" dirty="0" smtClean="0"/>
-              <a:t>the business case</a:t>
+              <a:t>the use case</a:t>
+            </a:r>
+            <a:r>
+              <a:rPr lang="en-US" sz="2400" baseline="0" dirty="0" smtClean="0"/>
+              <a:t> details </a:t>
             </a:r>
           </a:p>
           <a:p>
@@ -9447,6 +9674,226 @@
               <a:tabLst/>
               <a:defRPr/>
             </a:pPr>
+            <a:endParaRPr lang="en-GB" sz="2400" dirty="0" smtClean="0"/>
+          </a:p>
+          <a:p>
+            <a:pPr marL="0" marR="0" indent="0" algn="l" defTabSz="914400" rtl="0" eaLnBrk="1" fontAlgn="auto" latinLnBrk="0" hangingPunct="1">
+              <a:lnSpc>
+                <a:spcPct val="100000"/>
+              </a:lnSpc>
+              <a:spcBef>
+                <a:spcPts val="0"/>
+              </a:spcBef>
+              <a:spcAft>
+                <a:spcPts val="0"/>
+              </a:spcAft>
+              <a:buClrTx/>
+              <a:buSzTx/>
+              <a:buFont typeface="Arial"/>
+              <a:buNone/>
+              <a:tabLst/>
+              <a:defRPr/>
+            </a:pPr>
+            <a:r>
+              <a:rPr lang="en-GB" sz="2400" baseline="0" dirty="0" smtClean="0"/>
+              <a:t>Currently they lack sufficient information as to which aircraft would be most beneficial to certify.</a:t>
+            </a:r>
+          </a:p>
+          <a:p>
+            <a:pPr marL="0" marR="0" indent="0" algn="l" defTabSz="914400" rtl="0" eaLnBrk="1" fontAlgn="auto" latinLnBrk="0" hangingPunct="1">
+              <a:lnSpc>
+                <a:spcPct val="100000"/>
+              </a:lnSpc>
+              <a:spcBef>
+                <a:spcPts val="0"/>
+              </a:spcBef>
+              <a:spcAft>
+                <a:spcPts val="0"/>
+              </a:spcAft>
+              <a:buClrTx/>
+              <a:buSzTx/>
+              <a:buFont typeface="Arial"/>
+              <a:buNone/>
+              <a:tabLst/>
+              <a:defRPr/>
+            </a:pPr>
+            <a:endParaRPr lang="en-GB" sz="2400" dirty="0" smtClean="0"/>
+          </a:p>
+          <a:p>
+            <a:pPr marL="0" marR="0" indent="0" algn="l" defTabSz="914400" rtl="0" eaLnBrk="1" fontAlgn="auto" latinLnBrk="0" hangingPunct="1">
+              <a:lnSpc>
+                <a:spcPct val="100000"/>
+              </a:lnSpc>
+              <a:spcBef>
+                <a:spcPts val="0"/>
+              </a:spcBef>
+              <a:spcAft>
+                <a:spcPts val="0"/>
+              </a:spcAft>
+              <a:buClrTx/>
+              <a:buSzTx/>
+              <a:buFont typeface="Arial"/>
+              <a:buNone/>
+              <a:tabLst/>
+              <a:defRPr/>
+            </a:pPr>
+            <a:r>
+              <a:rPr lang="en-GB" sz="2400" dirty="0" smtClean="0"/>
+              <a:t>They</a:t>
+            </a:r>
+            <a:r>
+              <a:rPr lang="en-GB" sz="2400" baseline="0" dirty="0" smtClean="0"/>
+              <a:t> desire to acquire the analytical capabilities to at any time retrieve information about certification and sort by relevance.</a:t>
+            </a:r>
+          </a:p>
+          <a:p>
+            <a:pPr marL="0" marR="0" indent="0" algn="l" defTabSz="914400" rtl="0" eaLnBrk="1" fontAlgn="auto" latinLnBrk="0" hangingPunct="1">
+              <a:lnSpc>
+                <a:spcPct val="100000"/>
+              </a:lnSpc>
+              <a:spcBef>
+                <a:spcPts val="0"/>
+              </a:spcBef>
+              <a:spcAft>
+                <a:spcPts val="0"/>
+              </a:spcAft>
+              <a:buClrTx/>
+              <a:buSzTx/>
+              <a:buFont typeface="Arial"/>
+              <a:buNone/>
+              <a:tabLst/>
+              <a:defRPr/>
+            </a:pPr>
+            <a:endParaRPr lang="en-GB" sz="2400" dirty="0" smtClean="0"/>
+          </a:p>
+          <a:p>
+            <a:pPr marL="0" marR="0" indent="0" algn="l" defTabSz="914400" rtl="0" eaLnBrk="1" fontAlgn="auto" latinLnBrk="0" hangingPunct="1">
+              <a:lnSpc>
+                <a:spcPct val="100000"/>
+              </a:lnSpc>
+              <a:spcBef>
+                <a:spcPts val="0"/>
+              </a:spcBef>
+              <a:spcAft>
+                <a:spcPts val="0"/>
+              </a:spcAft>
+              <a:buClrTx/>
+              <a:buSzTx/>
+              <a:buFont typeface="Arial"/>
+              <a:buNone/>
+              <a:tabLst/>
+              <a:defRPr/>
+            </a:pPr>
+            <a:r>
+              <a:rPr lang="en-GB" sz="2400" dirty="0" smtClean="0"/>
+              <a:t>The</a:t>
+            </a:r>
+            <a:r>
+              <a:rPr lang="en-GB" sz="2400" baseline="0" dirty="0" smtClean="0"/>
+              <a:t> possible data sources to look at are : </a:t>
+            </a:r>
+          </a:p>
+          <a:p>
+            <a:pPr marL="0" marR="0" indent="0" algn="l" defTabSz="914400" rtl="0" eaLnBrk="1" fontAlgn="auto" latinLnBrk="0" hangingPunct="1">
+              <a:lnSpc>
+                <a:spcPct val="100000"/>
+              </a:lnSpc>
+              <a:spcBef>
+                <a:spcPts val="0"/>
+              </a:spcBef>
+              <a:spcAft>
+                <a:spcPts val="0"/>
+              </a:spcAft>
+              <a:buClrTx/>
+              <a:buSzTx/>
+              <a:buFont typeface="Arial"/>
+              <a:buNone/>
+              <a:tabLst/>
+              <a:defRPr/>
+            </a:pPr>
+            <a:endParaRPr lang="en-GB" sz="2400" baseline="0" dirty="0" smtClean="0"/>
+          </a:p>
+          <a:p>
+            <a:pPr marL="0" marR="0" indent="0" algn="l" defTabSz="914400" rtl="0" eaLnBrk="1" fontAlgn="auto" latinLnBrk="0" hangingPunct="1">
+              <a:lnSpc>
+                <a:spcPct val="100000"/>
+              </a:lnSpc>
+              <a:spcBef>
+                <a:spcPts val="0"/>
+              </a:spcBef>
+              <a:spcAft>
+                <a:spcPts val="0"/>
+              </a:spcAft>
+              <a:buClrTx/>
+              <a:buSzTx/>
+              <a:buFont typeface="Arial"/>
+              <a:buNone/>
+              <a:tabLst/>
+              <a:defRPr/>
+            </a:pPr>
+            <a:r>
+              <a:rPr lang="en-GB" sz="2400" baseline="0" dirty="0" smtClean="0"/>
+              <a:t>And to perform exploratory analysis to meet the objective</a:t>
+            </a:r>
+          </a:p>
+          <a:p>
+            <a:pPr marL="0" marR="0" indent="0" algn="l" defTabSz="914400" rtl="0" eaLnBrk="1" fontAlgn="auto" latinLnBrk="0" hangingPunct="1">
+              <a:lnSpc>
+                <a:spcPct val="100000"/>
+              </a:lnSpc>
+              <a:spcBef>
+                <a:spcPts val="0"/>
+              </a:spcBef>
+              <a:spcAft>
+                <a:spcPts val="0"/>
+              </a:spcAft>
+              <a:buClrTx/>
+              <a:buSzTx/>
+              <a:buFont typeface="Arial"/>
+              <a:buNone/>
+              <a:tabLst/>
+              <a:defRPr/>
+            </a:pPr>
+            <a:endParaRPr lang="en-GB" sz="2400" baseline="0" dirty="0" smtClean="0"/>
+          </a:p>
+          <a:p>
+            <a:pPr marL="0" marR="0" indent="0" algn="l" defTabSz="914400" rtl="0" eaLnBrk="1" fontAlgn="auto" latinLnBrk="0" hangingPunct="1">
+              <a:lnSpc>
+                <a:spcPct val="100000"/>
+              </a:lnSpc>
+              <a:spcBef>
+                <a:spcPts val="0"/>
+              </a:spcBef>
+              <a:spcAft>
+                <a:spcPts val="0"/>
+              </a:spcAft>
+              <a:buClrTx/>
+              <a:buSzTx/>
+              <a:buFont typeface="Arial"/>
+              <a:buNone/>
+              <a:tabLst/>
+              <a:defRPr/>
+            </a:pPr>
+            <a:endParaRPr lang="en-GB" sz="1200" dirty="0" smtClean="0"/>
+          </a:p>
+          <a:p>
+            <a:pPr marL="0" marR="0" indent="0" algn="l" defTabSz="914400" rtl="0" eaLnBrk="1" fontAlgn="auto" latinLnBrk="0" hangingPunct="1">
+              <a:lnSpc>
+                <a:spcPct val="100000"/>
+              </a:lnSpc>
+              <a:spcBef>
+                <a:spcPts val="0"/>
+              </a:spcBef>
+              <a:spcAft>
+                <a:spcPts val="0"/>
+              </a:spcAft>
+              <a:buClrTx/>
+              <a:buSzTx/>
+              <a:buFont typeface="Arial"/>
+              <a:buNone/>
+              <a:tabLst/>
+              <a:defRPr/>
+            </a:pPr>
             <a:endParaRPr lang="en-GB" sz="1200" dirty="0" smtClean="0"/>
           </a:p>
           <a:p>
@@ -9833,51 +10280,51 @@
           <a:lstStyle/>
           <a:p>
             <a:r>
-              <a:rPr lang="en-US" dirty="0" smtClean="0"/>
+              <a:rPr lang="en-US" sz="2400" dirty="0" smtClean="0"/>
               <a:t>Optimize business</a:t>
             </a:r>
             <a:r>
-              <a:rPr lang="en-US" baseline="0" dirty="0" smtClean="0"/>
+              <a:rPr lang="en-US" sz="2400" baseline="0" dirty="0" smtClean="0"/>
               <a:t> operation cost </a:t>
             </a:r>
           </a:p>
           <a:p>
-            <a:endParaRPr lang="en-US" dirty="0" smtClean="0"/>
-          </a:p>
-          <a:p>
-            <a:r>
-              <a:rPr lang="en-US" dirty="0" smtClean="0"/>
+            <a:endParaRPr lang="en-US" sz="2400" dirty="0" smtClean="0"/>
+          </a:p>
+          <a:p>
+            <a:r>
+              <a:rPr lang="en-US" sz="2400" dirty="0" smtClean="0"/>
               <a:t>Cost of delays in US $32.9B   ($12,5B)</a:t>
             </a:r>
           </a:p>
           <a:p>
             <a:r>
-              <a:rPr lang="en-US" dirty="0" smtClean="0"/>
+              <a:rPr lang="en-US" sz="2400" dirty="0" smtClean="0"/>
               <a:t>$8.3B cost to Airlines</a:t>
             </a:r>
           </a:p>
           <a:p>
             <a:r>
-              <a:rPr lang="en-US" dirty="0" smtClean="0"/>
+              <a:rPr lang="en-US" sz="2400" dirty="0" smtClean="0"/>
               <a:t>$16,7B cost to</a:t>
             </a:r>
             <a:r>
-              <a:rPr lang="en-US" baseline="0" dirty="0" smtClean="0"/>
+              <a:rPr lang="en-US" sz="2400" baseline="0" dirty="0" smtClean="0"/>
               <a:t> Passengers</a:t>
             </a:r>
           </a:p>
           <a:p>
             <a:r>
-              <a:rPr lang="en-US" baseline="0" dirty="0" smtClean="0"/>
+              <a:rPr lang="en-US" sz="2400" baseline="0" dirty="0" smtClean="0"/>
               <a:t>$3,9B Cost from lost demand</a:t>
             </a:r>
           </a:p>
           <a:p>
             <a:r>
-              <a:rPr lang="en-US" baseline="0" dirty="0" smtClean="0"/>
+              <a:rPr lang="en-US" sz="2400" baseline="0" dirty="0" smtClean="0"/>
               <a:t>$4B GDP impact</a:t>
             </a:r>
-            <a:endParaRPr lang="en-US" dirty="0"/>
+            <a:endParaRPr lang="en-US" sz="2400" dirty="0"/>
           </a:p>
         </p:txBody>
       </p:sp>
@@ -32181,7 +32628,7 @@
             </a:pPr>
             <a:r>
               <a:rPr lang="en-US" sz="1500" b="0" dirty="0" smtClean="0"/>
-              <a:t>(Ashish </a:t>
+              <a:t>(FLY BIG Team: Ashish </a:t>
             </a:r>
             <a:r>
               <a:rPr lang="en-US" sz="1500" b="0" dirty="0"/>
@@ -36637,36 +37084,6 @@
           </a:p>
         </p:txBody>
       </p:sp>
-      <p:sp>
-        <p:nvSpPr>
-          <p:cNvPr id="4" name="Date Placeholder 3"/>
-          <p:cNvSpPr>
-            <a:spLocks noGrp="1"/>
-          </p:cNvSpPr>
-          <p:nvPr>
-            <p:ph type="dt" sz="half" idx="4294967295"/>
-          </p:nvPr>
-        </p:nvSpPr>
-        <p:spPr>
-          <a:xfrm>
-            <a:off x="603956" y="6555796"/>
-            <a:ext cx="2245077" cy="143629"/>
-          </a:xfrm>
-          <a:prstGeom prst="rect">
-            <a:avLst/>
-          </a:prstGeom>
-        </p:spPr>
-        <p:txBody>
-          <a:bodyPr lIns="121917" tIns="60958" rIns="121917" bIns="60958"/>
-          <a:lstStyle/>
-          <a:p>
-            <a:r>
-              <a:rPr lang="en-US" dirty="0" smtClean="0"/>
-              <a:t>© 2017 Teradata</a:t>
-            </a:r>
-          </a:p>
-        </p:txBody>
-      </p:sp>
       <p:graphicFrame>
         <p:nvGraphicFramePr>
           <p:cNvPr id="2" name="Diagram 1"/>
@@ -36674,18 +37091,18 @@
           <p:nvPr>
             <p:extLst>
               <p:ext uri="{D42A27DB-BD31-4B8C-83A1-F6EECF244321}">
-                <p14:modId xmlns:p14="http://schemas.microsoft.com/office/powerpoint/2010/main" val="4161709434"/>
+                <p14:modId xmlns:p14="http://schemas.microsoft.com/office/powerpoint/2010/main" val="3753993616"/>
               </p:ext>
             </p:extLst>
           </p:nvPr>
         </p:nvGraphicFramePr>
         <p:xfrm>
-          <a:off x="705807" y="1296979"/>
+          <a:off x="705807" y="1215919"/>
           <a:ext cx="10281183" cy="5418667"/>
         </p:xfrm>
         <a:graphic>
           <a:graphicData uri="http://schemas.openxmlformats.org/drawingml/2006/diagram">
-            <dgm:relIds xmlns:dgm="http://schemas.openxmlformats.org/drawingml/2006/diagram" xmlns:r="http://schemas.openxmlformats.org/officeDocument/2006/relationships" r:dm="rId2" r:lo="rId3" r:qs="rId4" r:cs="rId5"/>
+            <dgm:relIds xmlns:dgm="http://schemas.openxmlformats.org/drawingml/2006/diagram" xmlns:r="http://schemas.openxmlformats.org/officeDocument/2006/relationships" r:dm="rId3" r:lo="rId4" r:qs="rId5" r:cs="rId6"/>
           </a:graphicData>
         </a:graphic>
       </p:graphicFrame>
@@ -37355,96 +37772,9 @@
   <p:timing>
     <p:tnLst>
       <p:par>
-        <p:cTn xmlns:p14="http://schemas.microsoft.com/office/powerpoint/2010/main" id="1" dur="indefinite" restart="never" nodeType="tmRoot">
-          <p:childTnLst>
-            <p:seq concurrent="1" nextAc="seek">
-              <p:cTn id="2" dur="indefinite" nodeType="mainSeq">
-                <p:childTnLst>
-                  <p:par>
-                    <p:cTn id="3" fill="hold">
-                      <p:stCondLst>
-                        <p:cond delay="indefinite"/>
-                      </p:stCondLst>
-                      <p:childTnLst>
-                        <p:par>
-                          <p:cTn id="4" fill="hold">
-                            <p:stCondLst>
-                              <p:cond delay="0"/>
-                            </p:stCondLst>
-                            <p:childTnLst>
-                              <p:par>
-                                <p:cTn id="5" presetID="10" presetClass="entr" presetSubtype="0" fill="hold" grpId="0" nodeType="clickEffect">
-                                  <p:stCondLst>
-                                    <p:cond delay="0"/>
-                                  </p:stCondLst>
-                                  <p:childTnLst>
-                                    <p:set>
-                                      <p:cBhvr>
-                                        <p:cTn id="6" dur="1" fill="hold">
-                                          <p:stCondLst>
-                                            <p:cond delay="0"/>
-                                          </p:stCondLst>
-                                        </p:cTn>
-                                        <p:tgtEl>
-                                          <p:spTgt spid="3">
-                                            <p:txEl>
-                                              <p:pRg st="3" end="3"/>
-                                            </p:txEl>
-                                          </p:spTgt>
-                                        </p:tgtEl>
-                                        <p:attrNameLst>
-                                          <p:attrName>style.visibility</p:attrName>
-                                        </p:attrNameLst>
-                                      </p:cBhvr>
-                                      <p:to>
-                                        <p:strVal val="visible"/>
-                                      </p:to>
-                                    </p:set>
-                                    <p:animEffect transition="in" filter="fade">
-                                      <p:cBhvr>
-                                        <p:cTn id="7" dur="500"/>
-                                        <p:tgtEl>
-                                          <p:spTgt spid="3">
-                                            <p:txEl>
-                                              <p:pRg st="3" end="3"/>
-                                            </p:txEl>
-                                          </p:spTgt>
-                                        </p:tgtEl>
-                                      </p:cBhvr>
-                                    </p:animEffect>
-                                  </p:childTnLst>
-                                </p:cTn>
-                              </p:par>
-                            </p:childTnLst>
-                          </p:cTn>
-                        </p:par>
-                      </p:childTnLst>
-                    </p:cTn>
-                  </p:par>
-                </p:childTnLst>
-              </p:cTn>
-              <p:prevCondLst>
-                <p:cond evt="onPrev" delay="0">
-                  <p:tgtEl>
-                    <p:sldTgt/>
-                  </p:tgtEl>
-                </p:cond>
-              </p:prevCondLst>
-              <p:nextCondLst>
-                <p:cond evt="onNext" delay="0">
-                  <p:tgtEl>
-                    <p:sldTgt/>
-                  </p:tgtEl>
-                </p:cond>
-              </p:nextCondLst>
-            </p:seq>
-          </p:childTnLst>
-        </p:cTn>
+        <p:cTn xmlns:p14="http://schemas.microsoft.com/office/powerpoint/2010/main" id="1" dur="indefinite" restart="never" nodeType="tmRoot"/>
       </p:par>
     </p:tnLst>
-    <p:bldLst>
-      <p:bldP spid="3" grpId="0" uiExpand="1" build="p"/>
-    </p:bldLst>
   </p:timing>
 </p:sld>
 </file>
@@ -37490,9 +37820,12 @@
             </a:pPr>
             <a:r>
               <a:rPr lang="en-US" sz="2000" dirty="0"/>
-              <a:t>Identified &amp; developed the use case details </a:t>
-            </a:r>
-            <a:endParaRPr lang="en-US" sz="2000" dirty="0" smtClean="0"/>
+              <a:t>Identified &amp; developed the use case </a:t>
+            </a:r>
+            <a:r>
+              <a:rPr lang="en-US" sz="2000" dirty="0" smtClean="0"/>
+              <a:t>details*</a:t>
+            </a:r>
           </a:p>
           <a:p>
             <a:pPr marL="457189" indent="-457189">
@@ -37940,30 +38273,13 @@
                   <a:srgbClr val="3C3C3B"/>
                 </a:solidFill>
               </a:rPr>
-              <a:t>Detail</a:t>
-            </a:r>
-          </a:p>
-          <a:p>
-            <a:pPr algn="ctr"/>
-            <a:r>
-              <a:rPr lang="en-US" sz="1300" dirty="0">
-                <a:solidFill>
-                  <a:srgbClr val="3C3C3B"/>
-                </a:solidFill>
-              </a:rPr>
-              <a:t>Use Case</a:t>
-            </a:r>
-          </a:p>
-          <a:p>
-            <a:pPr algn="ctr"/>
-            <a:r>
-              <a:rPr lang="en-US" sz="1300" dirty="0">
-                <a:solidFill>
-                  <a:srgbClr val="3C3C3B"/>
-                </a:solidFill>
-              </a:rPr>
-              <a:t>1</a:t>
-            </a:r>
+              <a:t>Client interview </a:t>
+            </a:r>
+            <a:endParaRPr lang="en-US" sz="1300" dirty="0">
+              <a:solidFill>
+                <a:srgbClr val="3C3C3B"/>
+              </a:solidFill>
+            </a:endParaRPr>
           </a:p>
         </p:txBody>
       </p:sp>
@@ -38009,13 +38325,18 @@
           <a:p>
             <a:pPr algn="ctr"/>
             <a:r>
-              <a:rPr lang="en-US" sz="1300" dirty="0">
+              <a:rPr lang="en-US" sz="1300" dirty="0" smtClean="0">
                 <a:solidFill>
                   <a:srgbClr val="3C3C3B"/>
                 </a:solidFill>
               </a:rPr>
-              <a:t>Detail</a:t>
-            </a:r>
+              <a:t>Detailed</a:t>
+            </a:r>
+            <a:endParaRPr lang="en-US" sz="1300" dirty="0">
+              <a:solidFill>
+                <a:srgbClr val="3C3C3B"/>
+              </a:solidFill>
+            </a:endParaRPr>
           </a:p>
           <a:p>
             <a:pPr algn="ctr"/>
@@ -38030,14 +38351,11 @@
           </a:p>
           <a:p>
             <a:pPr algn="ctr"/>
-            <a:r>
-              <a:rPr lang="en-US" sz="1300" dirty="0">
-                <a:solidFill>
-                  <a:srgbClr val="3C3C3B"/>
-                </a:solidFill>
-              </a:rPr>
-              <a:t>2</a:t>
-            </a:r>
+            <a:endParaRPr lang="en-US" sz="1300" dirty="0">
+              <a:solidFill>
+                <a:srgbClr val="3C3C3B"/>
+              </a:solidFill>
+            </a:endParaRPr>
           </a:p>
         </p:txBody>
       </p:sp>
@@ -38196,26 +38514,13 @@
           <a:p>
             <a:pPr algn="ctr"/>
             <a:r>
-              <a:rPr lang="en-US" sz="1300" dirty="0">
-                <a:solidFill>
-                  <a:srgbClr val="3C3C3B"/>
-                </a:solidFill>
-              </a:rPr>
-              <a:t> Big Data </a:t>
-            </a:r>
-            <a:r>
               <a:rPr lang="en-US" sz="1300" dirty="0" smtClean="0">
                 <a:solidFill>
                   <a:srgbClr val="3C3C3B"/>
                 </a:solidFill>
               </a:rPr>
-              <a:t>Discovery</a:t>
-            </a:r>
-            <a:endParaRPr lang="en-US" sz="1300" dirty="0">
-              <a:solidFill>
-                <a:srgbClr val="3C3C3B"/>
-              </a:solidFill>
-            </a:endParaRPr>
+              <a:t>Business Problem</a:t>
+            </a:r>
           </a:p>
         </p:txBody>
       </p:sp>
@@ -38296,6 +38601,130 @@
               <a:t>© 2015 Teradata, The Culture Of Analytics</a:t>
             </a:r>
             <a:endParaRPr lang="en-US" dirty="0"/>
+          </a:p>
+        </p:txBody>
+      </p:sp>
+      <p:sp>
+        <p:nvSpPr>
+          <p:cNvPr id="3" name="TextBox 2"/>
+          <p:cNvSpPr txBox="1"/>
+          <p:nvPr/>
+        </p:nvSpPr>
+        <p:spPr>
+          <a:xfrm>
+            <a:off x="5573017" y="5772048"/>
+            <a:ext cx="6009383" cy="722762"/>
+          </a:xfrm>
+          <a:prstGeom prst="rect">
+            <a:avLst/>
+          </a:prstGeom>
+          <a:noFill/>
+        </p:spPr>
+        <p:txBody>
+          <a:bodyPr wrap="square" rtlCol="0">
+            <a:spAutoFit/>
+          </a:bodyPr>
+          <a:lstStyle/>
+          <a:p>
+            <a:pPr>
+              <a:lnSpc>
+                <a:spcPct val="95000"/>
+              </a:lnSpc>
+              <a:spcBef>
+                <a:spcPts val="400"/>
+              </a:spcBef>
+            </a:pPr>
+            <a:r>
+              <a:rPr lang="en-US" sz="1200" dirty="0" smtClean="0">
+                <a:solidFill>
+                  <a:srgbClr val="231F20"/>
+                </a:solidFill>
+              </a:rPr>
+              <a:t>*Based on interview with : </a:t>
+            </a:r>
+            <a:r>
+              <a:rPr lang="en-US" sz="1200" dirty="0" smtClean="0">
+                <a:solidFill>
+                  <a:srgbClr val="231F20"/>
+                </a:solidFill>
+              </a:rPr>
+              <a:t>CEO : Phil, </a:t>
+            </a:r>
+            <a:r>
+              <a:rPr lang="en-US" sz="1200" dirty="0">
+                <a:solidFill>
+                  <a:srgbClr val="231F20"/>
+                </a:solidFill>
+              </a:rPr>
+              <a:t> </a:t>
+            </a:r>
+            <a:r>
+              <a:rPr lang="en-US" sz="1200" dirty="0" smtClean="0">
+                <a:solidFill>
+                  <a:srgbClr val="231F20"/>
+                </a:solidFill>
+              </a:rPr>
+              <a:t>COO : </a:t>
+            </a:r>
+            <a:r>
+              <a:rPr lang="en-US" sz="1200" dirty="0" err="1" smtClean="0">
+                <a:solidFill>
+                  <a:srgbClr val="231F20"/>
+                </a:solidFill>
+              </a:rPr>
+              <a:t>Clif</a:t>
+            </a:r>
+            <a:r>
+              <a:rPr lang="en-US" sz="1200" dirty="0" smtClean="0">
+                <a:solidFill>
+                  <a:srgbClr val="231F20"/>
+                </a:solidFill>
+              </a:rPr>
+              <a:t> , </a:t>
+            </a:r>
+            <a:r>
+              <a:rPr lang="en-US" sz="1200" dirty="0" smtClean="0">
+                <a:solidFill>
+                  <a:srgbClr val="231F20"/>
+                </a:solidFill>
+              </a:rPr>
+              <a:t>CTO: Sheldon</a:t>
+            </a:r>
+            <a:endParaRPr lang="en-US" sz="1200" dirty="0" smtClean="0">
+              <a:solidFill>
+                <a:srgbClr val="231F20"/>
+              </a:solidFill>
+            </a:endParaRPr>
+          </a:p>
+          <a:p>
+            <a:pPr>
+              <a:lnSpc>
+                <a:spcPct val="95000"/>
+              </a:lnSpc>
+              <a:spcBef>
+                <a:spcPts val="400"/>
+              </a:spcBef>
+            </a:pPr>
+            <a:endParaRPr lang="en-US" sz="1200" dirty="0" smtClean="0">
+              <a:solidFill>
+                <a:srgbClr val="231F20"/>
+              </a:solidFill>
+            </a:endParaRPr>
+          </a:p>
+          <a:p>
+            <a:pPr>
+              <a:lnSpc>
+                <a:spcPct val="95000"/>
+              </a:lnSpc>
+              <a:spcBef>
+                <a:spcPts val="400"/>
+              </a:spcBef>
+            </a:pPr>
+            <a:endParaRPr lang="en-US" sz="1200" dirty="0" smtClean="0">
+              <a:solidFill>
+                <a:srgbClr val="231F20"/>
+              </a:solidFill>
+            </a:endParaRPr>
           </a:p>
         </p:txBody>
       </p:sp>
@@ -38470,7 +38899,7 @@
             <p:ph idx="1"/>
             <p:extLst>
               <p:ext uri="{D42A27DB-BD31-4B8C-83A1-F6EECF244321}">
-                <p14:modId xmlns:p14="http://schemas.microsoft.com/office/powerpoint/2010/main" val="4025381365"/>
+                <p14:modId xmlns:p14="http://schemas.microsoft.com/office/powerpoint/2010/main" val="3306254398"/>
               </p:ext>
             </p:extLst>
           </p:nvPr>
@@ -38554,7 +38983,15 @@
                       </a:pPr>
                       <a:r>
                         <a:rPr lang="en-GB" sz="1600" baseline="0" dirty="0" smtClean="0"/>
-                        <a:t>Currently lacks sufficient information as to which aircraft would be most beneficial to certify.</a:t>
+                        <a:t>Currently </a:t>
+                      </a:r>
+                      <a:r>
+                        <a:rPr lang="en-GB" sz="1600" baseline="0" dirty="0" smtClean="0"/>
+                        <a:t>they lack </a:t>
+                      </a:r>
+                      <a:r>
+                        <a:rPr lang="en-GB" sz="1600" baseline="0" dirty="0" smtClean="0"/>
+                        <a:t>sufficient information as to which aircraft would be most beneficial to certify.</a:t>
                       </a:r>
                     </a:p>
                     <a:p>
@@ -39238,7 +39675,7 @@
             <p:ph idx="1"/>
             <p:extLst>
               <p:ext uri="{D42A27DB-BD31-4B8C-83A1-F6EECF244321}">
-                <p14:modId xmlns:p14="http://schemas.microsoft.com/office/powerpoint/2010/main" val="2412614285"/>
+                <p14:modId xmlns:p14="http://schemas.microsoft.com/office/powerpoint/2010/main" val="4114347558"/>
               </p:ext>
             </p:extLst>
           </p:nvPr>
@@ -40006,7 +40443,17 @@
                           <a:effectLst/>
                           <a:latin typeface="Calibri"/>
                         </a:rPr>
-                        <a:t>-$80M</a:t>
+                        <a:t>-</a:t>
+                      </a:r>
+                      <a:r>
+                        <a:rPr lang="is-IS" sz="1800" b="1" i="0" u="none" strike="noStrike" dirty="0" smtClean="0">
+                          <a:solidFill>
+                            <a:srgbClr val="000000"/>
+                          </a:solidFill>
+                          <a:effectLst/>
+                          <a:latin typeface="Calibri"/>
+                        </a:rPr>
+                        <a:t>$2M</a:t>
                       </a:r>
                       <a:endParaRPr lang="is-IS" sz="1800" b="1" i="0" u="none" strike="noStrike" dirty="0">
                         <a:solidFill>
@@ -40081,7 +40528,7 @@
                           <a:effectLst/>
                           <a:latin typeface="Calibri"/>
                         </a:rPr>
-                        <a:t>$40M</a:t>
+                        <a:t>$138M</a:t>
                       </a:r>
                       <a:endParaRPr lang="is-IS" sz="1800" b="1" i="0" u="none" strike="noStrike" dirty="0">
                         <a:solidFill>
@@ -40216,6 +40663,51 @@
           </a:p>
         </p:txBody>
       </p:sp>
+      <p:sp>
+        <p:nvSpPr>
+          <p:cNvPr id="6" name="Rounded Rectangle 5"/>
+          <p:cNvSpPr/>
+          <p:nvPr/>
+        </p:nvSpPr>
+        <p:spPr>
+          <a:xfrm>
+            <a:off x="783638" y="4161072"/>
+            <a:ext cx="5653025" cy="486359"/>
+          </a:xfrm>
+          <a:prstGeom prst="roundRect">
+            <a:avLst/>
+          </a:prstGeom>
+          <a:solidFill>
+            <a:srgbClr val="FFFF00">
+              <a:alpha val="36000"/>
+            </a:srgbClr>
+          </a:solidFill>
+          <a:ln w="9525">
+            <a:noFill/>
+            <a:miter lim="800000"/>
+            <a:headEnd/>
+            <a:tailEnd/>
+          </a:ln>
+          <a:effectLst/>
+        </p:spPr>
+        <p:txBody>
+          <a:bodyPr wrap="square" tIns="91440" bIns="91440" rtlCol="0" anchor="t">
+            <a:prstTxWarp prst="textNoShape">
+              <a:avLst/>
+            </a:prstTxWarp>
+            <a:noAutofit/>
+          </a:bodyPr>
+          <a:lstStyle/>
+          <a:p>
+            <a:pPr algn="ctr"/>
+            <a:endParaRPr lang="en-US" kern="0" dirty="0" err="1" smtClean="0">
+              <a:solidFill>
+                <a:prstClr val="white"/>
+              </a:solidFill>
+            </a:endParaRPr>
+          </a:p>
+        </p:txBody>
+      </p:sp>
     </p:spTree>
     <p:extLst>
       <p:ext uri="{BB962C8B-B14F-4D97-AF65-F5344CB8AC3E}">
@@ -40301,6 +40793,13 @@
   <p:transition xmlns:p14="http://schemas.microsoft.com/office/powerpoint/2010/main" spd="med">
     <p:fade/>
   </p:transition>
+  <p:timing>
+    <p:tnLst>
+      <p:par>
+        <p:cTn xmlns:p14="http://schemas.microsoft.com/office/powerpoint/2010/main" id="1" dur="indefinite" restart="never" nodeType="tmRoot"/>
+      </p:par>
+    </p:tnLst>
+  </p:timing>
 </p:sld>
 </file>
 
@@ -40369,7 +40868,7 @@
             <p:ph idx="1"/>
             <p:extLst>
               <p:ext uri="{D42A27DB-BD31-4B8C-83A1-F6EECF244321}">
-                <p14:modId xmlns:p14="http://schemas.microsoft.com/office/powerpoint/2010/main" val="4012775644"/>
+                <p14:modId xmlns:p14="http://schemas.microsoft.com/office/powerpoint/2010/main" val="556559901"/>
               </p:ext>
             </p:extLst>
           </p:nvPr>
@@ -40495,15 +40994,23 @@
                       </a:r>
                       <a:r>
                         <a:rPr lang="en-GB" sz="1600" baseline="0" dirty="0" smtClean="0"/>
-                        <a:t> offers flight delay prediction-as-a-service(</a:t>
+                        <a:t> offers flight delay </a:t>
                       </a:r>
                       <a:r>
-                        <a:rPr lang="en-GB" sz="1600" baseline="0" dirty="0" err="1" smtClean="0"/>
+                        <a:rPr lang="en-GB" sz="1600" b="1" baseline="0" dirty="0" smtClean="0"/>
+                        <a:t>prediction-as-a-service(</a:t>
+                      </a:r>
+                      <a:r>
+                        <a:rPr lang="en-GB" sz="1600" b="1" baseline="0" dirty="0" err="1" smtClean="0"/>
                         <a:t>PaaS</a:t>
                       </a:r>
                       <a:r>
+                        <a:rPr lang="en-GB" sz="1600" b="1" baseline="0" dirty="0" smtClean="0"/>
+                        <a:t>) </a:t>
+                      </a:r>
+                      <a:r>
                         <a:rPr lang="en-GB" sz="1600" baseline="0" dirty="0" smtClean="0"/>
-                        <a:t>) potentially contributing to a new revenue stream.</a:t>
+                        <a:t>potentially contributing to a new revenue stream.</a:t>
                       </a:r>
                     </a:p>
                   </a:txBody>

</xml_diff>